<commit_message>
Modificación de la presentación
</commit_message>
<xml_diff>
--- a/Android Bluetooth.pptx
+++ b/Android Bluetooth.pptx
@@ -2892,84 +2892,6 @@
       <dsp:cNvGrpSpPr/>
     </dsp:nvGrpSpPr>
     <dsp:grpSpPr/>
-    <dsp:sp modelId="{89C7C25C-C811-48AC-AC06-664466CF4A30}">
-      <dsp:nvSpPr>
-        <dsp:cNvPr id="0" name=""/>
-        <dsp:cNvSpPr/>
-      </dsp:nvSpPr>
-      <dsp:spPr>
-        <a:xfrm>
-          <a:off x="0" y="0"/>
-          <a:ext cx="1740756" cy="689598"/>
-        </a:xfrm>
-        <a:prstGeom prst="roundRect">
-          <a:avLst/>
-        </a:prstGeom>
-        <a:solidFill>
-          <a:schemeClr val="accent3">
-            <a:hueOff val="0"/>
-            <a:satOff val="0"/>
-            <a:lumOff val="0"/>
-            <a:alphaOff val="0"/>
-          </a:schemeClr>
-        </a:solidFill>
-        <a:ln w="12700" cap="flat" cmpd="sng" algn="ctr">
-          <a:solidFill>
-            <a:schemeClr val="lt1">
-              <a:hueOff val="0"/>
-              <a:satOff val="0"/>
-              <a:lumOff val="0"/>
-              <a:alphaOff val="0"/>
-            </a:schemeClr>
-          </a:solidFill>
-          <a:prstDash val="solid"/>
-          <a:miter lim="800000"/>
-        </a:ln>
-        <a:effectLst/>
-      </dsp:spPr>
-      <dsp:style>
-        <a:lnRef idx="2">
-          <a:scrgbClr r="0" g="0" b="0"/>
-        </a:lnRef>
-        <a:fillRef idx="1">
-          <a:scrgbClr r="0" g="0" b="0"/>
-        </a:fillRef>
-        <a:effectRef idx="0">
-          <a:scrgbClr r="0" g="0" b="0"/>
-        </a:effectRef>
-        <a:fontRef idx="minor">
-          <a:schemeClr val="lt1"/>
-        </a:fontRef>
-      </dsp:style>
-      <dsp:txBody>
-        <a:bodyPr spcFirstLastPara="0" vert="horz" wrap="square" lIns="68580" tIns="68580" rIns="68580" bIns="68580" numCol="1" spcCol="1270" anchor="ctr" anchorCtr="0">
-          <a:noAutofit/>
-        </a:bodyPr>
-        <a:lstStyle/>
-        <a:p>
-          <a:pPr lvl="0" algn="ctr" defTabSz="800100" rtl="0">
-            <a:lnSpc>
-              <a:spcPct val="90000"/>
-            </a:lnSpc>
-            <a:spcBef>
-              <a:spcPct val="0"/>
-            </a:spcBef>
-            <a:spcAft>
-              <a:spcPct val="35000"/>
-            </a:spcAft>
-          </a:pPr>
-          <a:r>
-            <a:rPr lang="es-AR" sz="1800" kern="1200" dirty="0" err="1" smtClean="0"/>
-            <a:t>onActivityResult</a:t>
-          </a:r>
-          <a:endParaRPr lang="es-AR" sz="1800" kern="1200" dirty="0"/>
-        </a:p>
-      </dsp:txBody>
-      <dsp:txXfrm>
-        <a:off x="33663" y="33663"/>
-        <a:ext cx="1673430" cy="622272"/>
-      </dsp:txXfrm>
-    </dsp:sp>
   </dsp:spTree>
 </dsp:drawing>
 </file>
@@ -3236,84 +3158,6 @@
       <dsp:cNvGrpSpPr/>
     </dsp:nvGrpSpPr>
     <dsp:grpSpPr/>
-    <dsp:sp modelId="{89C7C25C-C811-48AC-AC06-664466CF4A30}">
-      <dsp:nvSpPr>
-        <dsp:cNvPr id="0" name=""/>
-        <dsp:cNvSpPr/>
-      </dsp:nvSpPr>
-      <dsp:spPr>
-        <a:xfrm>
-          <a:off x="0" y="12058"/>
-          <a:ext cx="2271782" cy="694365"/>
-        </a:xfrm>
-        <a:prstGeom prst="roundRect">
-          <a:avLst/>
-        </a:prstGeom>
-        <a:solidFill>
-          <a:schemeClr val="accent3">
-            <a:hueOff val="0"/>
-            <a:satOff val="0"/>
-            <a:lumOff val="0"/>
-            <a:alphaOff val="0"/>
-          </a:schemeClr>
-        </a:solidFill>
-        <a:ln w="12700" cap="flat" cmpd="sng" algn="ctr">
-          <a:solidFill>
-            <a:schemeClr val="lt1">
-              <a:hueOff val="0"/>
-              <a:satOff val="0"/>
-              <a:lumOff val="0"/>
-              <a:alphaOff val="0"/>
-            </a:schemeClr>
-          </a:solidFill>
-          <a:prstDash val="solid"/>
-          <a:miter lim="800000"/>
-        </a:ln>
-        <a:effectLst/>
-      </dsp:spPr>
-      <dsp:style>
-        <a:lnRef idx="2">
-          <a:scrgbClr r="0" g="0" b="0"/>
-        </a:lnRef>
-        <a:fillRef idx="1">
-          <a:scrgbClr r="0" g="0" b="0"/>
-        </a:fillRef>
-        <a:effectRef idx="0">
-          <a:scrgbClr r="0" g="0" b="0"/>
-        </a:effectRef>
-        <a:fontRef idx="minor">
-          <a:schemeClr val="lt1"/>
-        </a:fontRef>
-      </dsp:style>
-      <dsp:txBody>
-        <a:bodyPr spcFirstLastPara="0" vert="horz" wrap="square" lIns="64770" tIns="64770" rIns="64770" bIns="64770" numCol="1" spcCol="1270" anchor="ctr" anchorCtr="0">
-          <a:noAutofit/>
-        </a:bodyPr>
-        <a:lstStyle/>
-        <a:p>
-          <a:pPr lvl="0" algn="ctr" defTabSz="755650" rtl="0">
-            <a:lnSpc>
-              <a:spcPct val="90000"/>
-            </a:lnSpc>
-            <a:spcBef>
-              <a:spcPct val="0"/>
-            </a:spcBef>
-            <a:spcAft>
-              <a:spcPct val="35000"/>
-            </a:spcAft>
-          </a:pPr>
-          <a:r>
-            <a:rPr lang="es-AR" sz="1700" kern="1200" dirty="0" err="1" smtClean="0"/>
-            <a:t>startActivityForResult</a:t>
-          </a:r>
-          <a:endParaRPr lang="es-AR" sz="1700" kern="1200" dirty="0"/>
-        </a:p>
-      </dsp:txBody>
-      <dsp:txXfrm>
-        <a:off x="33896" y="45954"/>
-        <a:ext cx="2203990" cy="626573"/>
-      </dsp:txXfrm>
-    </dsp:sp>
   </dsp:spTree>
 </dsp:drawing>
 </file>
@@ -7358,7 +7202,7 @@
           <a:p>
             <a:fld id="{8AFC8558-17CB-4184-A4FF-CF17D394E4EE}" type="datetimeFigureOut">
               <a:rPr lang="es-AR" smtClean="0"/>
-              <a:t>09/04/2015</a:t>
+              <a:t>14/04/2015</a:t>
             </a:fld>
             <a:endParaRPr lang="es-AR"/>
           </a:p>
@@ -7528,7 +7372,7 @@
           <a:p>
             <a:fld id="{8AFC8558-17CB-4184-A4FF-CF17D394E4EE}" type="datetimeFigureOut">
               <a:rPr lang="es-AR" smtClean="0"/>
-              <a:t>09/04/2015</a:t>
+              <a:t>14/04/2015</a:t>
             </a:fld>
             <a:endParaRPr lang="es-AR"/>
           </a:p>
@@ -7708,7 +7552,7 @@
           <a:p>
             <a:fld id="{8AFC8558-17CB-4184-A4FF-CF17D394E4EE}" type="datetimeFigureOut">
               <a:rPr lang="es-AR" smtClean="0"/>
-              <a:t>09/04/2015</a:t>
+              <a:t>14/04/2015</a:t>
             </a:fld>
             <a:endParaRPr lang="es-AR"/>
           </a:p>
@@ -7878,7 +7722,7 @@
           <a:p>
             <a:fld id="{8AFC8558-17CB-4184-A4FF-CF17D394E4EE}" type="datetimeFigureOut">
               <a:rPr lang="es-AR" smtClean="0"/>
-              <a:t>09/04/2015</a:t>
+              <a:t>14/04/2015</a:t>
             </a:fld>
             <a:endParaRPr lang="es-AR"/>
           </a:p>
@@ -8124,7 +7968,7 @@
           <a:p>
             <a:fld id="{8AFC8558-17CB-4184-A4FF-CF17D394E4EE}" type="datetimeFigureOut">
               <a:rPr lang="es-AR" smtClean="0"/>
-              <a:t>09/04/2015</a:t>
+              <a:t>14/04/2015</a:t>
             </a:fld>
             <a:endParaRPr lang="es-AR"/>
           </a:p>
@@ -8356,7 +8200,7 @@
           <a:p>
             <a:fld id="{8AFC8558-17CB-4184-A4FF-CF17D394E4EE}" type="datetimeFigureOut">
               <a:rPr lang="es-AR" smtClean="0"/>
-              <a:t>09/04/2015</a:t>
+              <a:t>14/04/2015</a:t>
             </a:fld>
             <a:endParaRPr lang="es-AR"/>
           </a:p>
@@ -8723,7 +8567,7 @@
           <a:p>
             <a:fld id="{8AFC8558-17CB-4184-A4FF-CF17D394E4EE}" type="datetimeFigureOut">
               <a:rPr lang="es-AR" smtClean="0"/>
-              <a:t>09/04/2015</a:t>
+              <a:t>14/04/2015</a:t>
             </a:fld>
             <a:endParaRPr lang="es-AR"/>
           </a:p>
@@ -8841,7 +8685,7 @@
           <a:p>
             <a:fld id="{8AFC8558-17CB-4184-A4FF-CF17D394E4EE}" type="datetimeFigureOut">
               <a:rPr lang="es-AR" smtClean="0"/>
-              <a:t>09/04/2015</a:t>
+              <a:t>14/04/2015</a:t>
             </a:fld>
             <a:endParaRPr lang="es-AR"/>
           </a:p>
@@ -8936,7 +8780,7 @@
           <a:p>
             <a:fld id="{8AFC8558-17CB-4184-A4FF-CF17D394E4EE}" type="datetimeFigureOut">
               <a:rPr lang="es-AR" smtClean="0"/>
-              <a:t>09/04/2015</a:t>
+              <a:t>14/04/2015</a:t>
             </a:fld>
             <a:endParaRPr lang="es-AR"/>
           </a:p>
@@ -9213,7 +9057,7 @@
           <a:p>
             <a:fld id="{8AFC8558-17CB-4184-A4FF-CF17D394E4EE}" type="datetimeFigureOut">
               <a:rPr lang="es-AR" smtClean="0"/>
-              <a:t>09/04/2015</a:t>
+              <a:t>14/04/2015</a:t>
             </a:fld>
             <a:endParaRPr lang="es-AR"/>
           </a:p>
@@ -9466,7 +9310,7 @@
           <a:p>
             <a:fld id="{8AFC8558-17CB-4184-A4FF-CF17D394E4EE}" type="datetimeFigureOut">
               <a:rPr lang="es-AR" smtClean="0"/>
-              <a:t>09/04/2015</a:t>
+              <a:t>14/04/2015</a:t>
             </a:fld>
             <a:endParaRPr lang="es-AR"/>
           </a:p>
@@ -9679,7 +9523,7 @@
           <a:p>
             <a:fld id="{8AFC8558-17CB-4184-A4FF-CF17D394E4EE}" type="datetimeFigureOut">
               <a:rPr lang="es-AR" smtClean="0"/>
-              <a:t>09/04/2015</a:t>
+              <a:t>14/04/2015</a:t>
             </a:fld>
             <a:endParaRPr lang="es-AR"/>
           </a:p>
@@ -15334,7 +15178,7 @@
         <p:spPr>
           <a:xfrm>
             <a:off x="155414" y="1047873"/>
-            <a:ext cx="11945841" cy="1938992"/>
+            <a:ext cx="11945841" cy="830997"/>
           </a:xfrm>
           <a:prstGeom prst="rect">
             <a:avLst/>
@@ -15352,265 +15196,162 @@
           <a:lstStyle/>
           <a:p>
             <a:r>
-              <a:rPr lang="es-AR" sz="2400" dirty="0" err="1" smtClean="0">
-                <a:latin typeface="Courier New" panose="02070309020205020404" pitchFamily="49" charset="0"/>
-                <a:cs typeface="Courier New" panose="02070309020205020404" pitchFamily="49" charset="0"/>
-              </a:rPr>
-              <a:t>BluetoothAdapter</a:t>
-            </a:r>
-            <a:r>
-              <a:rPr lang="es-AR" sz="2400" dirty="0" smtClean="0">
+              <a:rPr lang="es-AR" sz="2400" dirty="0">
                 <a:solidFill>
-                  <a:schemeClr val="bg1"/>
+                  <a:schemeClr val="accent6"/>
                 </a:solidFill>
-                <a:latin typeface="Courier New" panose="02070309020205020404" pitchFamily="49" charset="0"/>
-                <a:cs typeface="Courier New" panose="02070309020205020404" pitchFamily="49" charset="0"/>
+              </a:rPr>
+              <a:t>&lt;uses-</a:t>
+            </a:r>
+            <a:r>
+              <a:rPr lang="es-AR" sz="2400" dirty="0" err="1">
+                <a:solidFill>
+                  <a:schemeClr val="accent6"/>
+                </a:solidFill>
+              </a:rPr>
+              <a:t>permission</a:t>
+            </a:r>
+            <a:r>
+              <a:rPr lang="es-AR" sz="2400" dirty="0">
+                <a:solidFill>
+                  <a:schemeClr val="accent6"/>
+                </a:solidFill>
               </a:rPr>
               <a:t> </a:t>
             </a:r>
             <a:r>
-              <a:rPr lang="es-AR" sz="2400" dirty="0" err="1" smtClean="0">
+              <a:rPr lang="es-AR" sz="2400" dirty="0" err="1">
+                <a:solidFill>
+                  <a:srgbClr val="C00000"/>
+                </a:solidFill>
+              </a:rPr>
+              <a:t>android:name</a:t>
+            </a:r>
+            <a:r>
+              <a:rPr lang="es-AR" sz="2400" dirty="0">
+                <a:solidFill>
+                  <a:srgbClr val="C00000"/>
+                </a:solidFill>
+              </a:rPr>
+              <a:t>=</a:t>
+            </a:r>
+            <a:r>
+              <a:rPr lang="es-AR" sz="2400" i="1" dirty="0">
                 <a:solidFill>
                   <a:schemeClr val="accent1"/>
                 </a:solidFill>
-                <a:latin typeface="Courier New" panose="02070309020205020404" pitchFamily="49" charset="0"/>
-                <a:cs typeface="Courier New" panose="02070309020205020404" pitchFamily="49" charset="0"/>
-              </a:rPr>
-              <a:t>bluetoothAdapter</a:t>
-            </a:r>
-            <a:r>
-              <a:rPr lang="es-AR" sz="2400" dirty="0" smtClean="0">
+              </a:rPr>
+              <a:t>"</a:t>
+            </a:r>
+            <a:r>
+              <a:rPr lang="es-AR" sz="2400" i="1" dirty="0" err="1">
                 <a:solidFill>
                   <a:schemeClr val="accent1"/>
                 </a:solidFill>
-                <a:latin typeface="Courier New" panose="02070309020205020404" pitchFamily="49" charset="0"/>
-                <a:cs typeface="Courier New" panose="02070309020205020404" pitchFamily="49" charset="0"/>
-              </a:rPr>
-              <a:t> </a:t>
-            </a:r>
-            <a:r>
-              <a:rPr lang="es-AR" sz="2400" dirty="0" smtClean="0">
-                <a:latin typeface="Courier New" panose="02070309020205020404" pitchFamily="49" charset="0"/>
-                <a:cs typeface="Courier New" panose="02070309020205020404" pitchFamily="49" charset="0"/>
-              </a:rPr>
-              <a:t>=</a:t>
-            </a:r>
-            <a:r>
-              <a:rPr lang="es-AR" sz="2400" dirty="0" smtClean="0">
-                <a:solidFill>
-                  <a:schemeClr val="bg1"/>
-                </a:solidFill>
-                <a:latin typeface="Courier New" panose="02070309020205020404" pitchFamily="49" charset="0"/>
-                <a:cs typeface="Courier New" panose="02070309020205020404" pitchFamily="49" charset="0"/>
-              </a:rPr>
-              <a:t> </a:t>
-            </a:r>
-            <a:r>
-              <a:rPr lang="es-AR" sz="2400" dirty="0" err="1" smtClean="0">
-                <a:solidFill>
-                  <a:srgbClr val="7030A0"/>
-                </a:solidFill>
-                <a:latin typeface="Courier New" panose="02070309020205020404" pitchFamily="49" charset="0"/>
-                <a:cs typeface="Courier New" panose="02070309020205020404" pitchFamily="49" charset="0"/>
-              </a:rPr>
-              <a:t>null</a:t>
-            </a:r>
-            <a:r>
-              <a:rPr lang="es-AR" sz="2400" dirty="0" smtClean="0">
-                <a:latin typeface="Courier New" panose="02070309020205020404" pitchFamily="49" charset="0"/>
-                <a:cs typeface="Courier New" panose="02070309020205020404" pitchFamily="49" charset="0"/>
-              </a:rPr>
-              <a:t>;</a:t>
-            </a:r>
-          </a:p>
-          <a:p>
-            <a:r>
-              <a:rPr lang="es-AR" sz="2400" dirty="0" err="1" smtClean="0">
+              </a:rPr>
+              <a:t>android.permission.BLUETOOTH</a:t>
+            </a:r>
+            <a:r>
+              <a:rPr lang="es-AR" sz="2400" i="1" dirty="0">
                 <a:solidFill>
                   <a:schemeClr val="accent1"/>
                 </a:solidFill>
-                <a:latin typeface="Courier New" panose="02070309020205020404" pitchFamily="49" charset="0"/>
-                <a:cs typeface="Courier New" panose="02070309020205020404" pitchFamily="49" charset="0"/>
-              </a:rPr>
-              <a:t>bluetoothAdapter</a:t>
-            </a:r>
-            <a:r>
-              <a:rPr lang="es-AR" sz="2400" dirty="0" smtClean="0">
+              </a:rPr>
+              <a:t>"</a:t>
+            </a:r>
+            <a:r>
+              <a:rPr lang="es-AR" sz="2400" i="1" dirty="0"/>
+              <a:t> </a:t>
+            </a:r>
+            <a:r>
+              <a:rPr lang="es-AR" sz="2400" i="1" dirty="0">
+                <a:solidFill>
+                  <a:schemeClr val="accent6"/>
+                </a:solidFill>
+              </a:rPr>
+              <a:t>/&gt;</a:t>
+            </a:r>
+          </a:p>
+          <a:p>
+            <a:r>
+              <a:rPr lang="es-AR" sz="2400" dirty="0">
+                <a:solidFill>
+                  <a:schemeClr val="accent6"/>
+                </a:solidFill>
+              </a:rPr>
+              <a:t>&lt;uses-</a:t>
+            </a:r>
+            <a:r>
+              <a:rPr lang="es-AR" sz="2400" dirty="0" err="1">
+                <a:solidFill>
+                  <a:schemeClr val="accent6"/>
+                </a:solidFill>
+              </a:rPr>
+              <a:t>permission</a:t>
+            </a:r>
+            <a:r>
+              <a:rPr lang="es-AR" sz="2400" dirty="0">
+                <a:solidFill>
+                  <a:schemeClr val="accent6"/>
+                </a:solidFill>
+              </a:rPr>
+              <a:t> </a:t>
+            </a:r>
+            <a:r>
+              <a:rPr lang="es-AR" sz="2400" dirty="0" err="1">
+                <a:solidFill>
+                  <a:srgbClr val="C00000"/>
+                </a:solidFill>
+              </a:rPr>
+              <a:t>android:name</a:t>
+            </a:r>
+            <a:r>
+              <a:rPr lang="es-AR" sz="2400" dirty="0">
+                <a:solidFill>
+                  <a:srgbClr val="C00000"/>
+                </a:solidFill>
+              </a:rPr>
+              <a:t>=</a:t>
+            </a:r>
+            <a:r>
+              <a:rPr lang="es-AR" sz="2400" i="1" dirty="0">
                 <a:solidFill>
                   <a:schemeClr val="accent1"/>
                 </a:solidFill>
-                <a:latin typeface="Courier New" panose="02070309020205020404" pitchFamily="49" charset="0"/>
-                <a:cs typeface="Courier New" panose="02070309020205020404" pitchFamily="49" charset="0"/>
-              </a:rPr>
-              <a:t> </a:t>
-            </a:r>
-            <a:r>
-              <a:rPr lang="es-AR" sz="2400" dirty="0" smtClean="0">
-                <a:latin typeface="Courier New" panose="02070309020205020404" pitchFamily="49" charset="0"/>
-                <a:cs typeface="Courier New" panose="02070309020205020404" pitchFamily="49" charset="0"/>
-              </a:rPr>
-              <a:t>= </a:t>
-            </a:r>
-            <a:r>
-              <a:rPr lang="es-AR" sz="2400" dirty="0" err="1" smtClean="0">
-                <a:latin typeface="Courier New" panose="02070309020205020404" pitchFamily="49" charset="0"/>
-                <a:cs typeface="Courier New" panose="02070309020205020404" pitchFamily="49" charset="0"/>
-              </a:rPr>
-              <a:t>BluetoothAdapter.getDefaultAdapter</a:t>
-            </a:r>
-            <a:r>
-              <a:rPr lang="es-AR" sz="2400" dirty="0" smtClean="0">
-                <a:latin typeface="Courier New" panose="02070309020205020404" pitchFamily="49" charset="0"/>
-                <a:cs typeface="Courier New" panose="02070309020205020404" pitchFamily="49" charset="0"/>
-              </a:rPr>
-              <a:t>();</a:t>
-            </a:r>
-          </a:p>
-          <a:p>
-            <a:r>
-              <a:rPr lang="es-AR" sz="2400" dirty="0" err="1" smtClean="0">
-                <a:solidFill>
-                  <a:srgbClr val="7030A0"/>
-                </a:solidFill>
-                <a:latin typeface="Courier New" panose="02070309020205020404" pitchFamily="49" charset="0"/>
-                <a:cs typeface="Courier New" panose="02070309020205020404" pitchFamily="49" charset="0"/>
-              </a:rPr>
-              <a:t>if</a:t>
-            </a:r>
-            <a:r>
-              <a:rPr lang="es-AR" sz="2400" dirty="0" smtClean="0">
-                <a:solidFill>
-                  <a:srgbClr val="7030A0"/>
-                </a:solidFill>
-                <a:latin typeface="Courier New" panose="02070309020205020404" pitchFamily="49" charset="0"/>
-                <a:cs typeface="Courier New" panose="02070309020205020404" pitchFamily="49" charset="0"/>
-              </a:rPr>
-              <a:t> </a:t>
-            </a:r>
-            <a:r>
-              <a:rPr lang="es-AR" sz="2400" dirty="0" smtClean="0">
-                <a:latin typeface="Courier New" panose="02070309020205020404" pitchFamily="49" charset="0"/>
-                <a:cs typeface="Courier New" panose="02070309020205020404" pitchFamily="49" charset="0"/>
-              </a:rPr>
-              <a:t>(</a:t>
-            </a:r>
-            <a:r>
-              <a:rPr lang="es-AR" sz="2400" dirty="0" err="1" smtClean="0">
+              </a:rPr>
+              <a:t>"</a:t>
+            </a:r>
+            <a:r>
+              <a:rPr lang="es-AR" sz="2400" i="1" dirty="0" err="1">
                 <a:solidFill>
                   <a:schemeClr val="accent1"/>
                 </a:solidFill>
-                <a:latin typeface="Courier New" panose="02070309020205020404" pitchFamily="49" charset="0"/>
-                <a:cs typeface="Courier New" panose="02070309020205020404" pitchFamily="49" charset="0"/>
-              </a:rPr>
-              <a:t>bluetoothAdapter</a:t>
-            </a:r>
-            <a:r>
-              <a:rPr lang="es-AR" sz="2400" dirty="0" smtClean="0">
+              </a:rPr>
+              <a:t>android.permission.BLUETOOTH_ADMIN</a:t>
+            </a:r>
+            <a:r>
+              <a:rPr lang="es-AR" sz="2400" i="1" dirty="0">
                 <a:solidFill>
                   <a:schemeClr val="accent1"/>
                 </a:solidFill>
-                <a:latin typeface="Courier New" panose="02070309020205020404" pitchFamily="49" charset="0"/>
-                <a:cs typeface="Courier New" panose="02070309020205020404" pitchFamily="49" charset="0"/>
-              </a:rPr>
-              <a:t> </a:t>
-            </a:r>
-            <a:r>
-              <a:rPr lang="es-AR" sz="2400" dirty="0" smtClean="0">
-                <a:latin typeface="Courier New" panose="02070309020205020404" pitchFamily="49" charset="0"/>
-                <a:cs typeface="Courier New" panose="02070309020205020404" pitchFamily="49" charset="0"/>
-              </a:rPr>
-              <a:t>==</a:t>
-            </a:r>
-            <a:r>
-              <a:rPr lang="es-AR" sz="2400" dirty="0" smtClean="0">
+              </a:rPr>
+              <a:t>"</a:t>
+            </a:r>
+            <a:r>
+              <a:rPr lang="es-AR" sz="2400" i="1" dirty="0">
                 <a:solidFill>
-                  <a:schemeClr val="bg1"/>
+                  <a:schemeClr val="accent6"/>
                 </a:solidFill>
-                <a:latin typeface="Courier New" panose="02070309020205020404" pitchFamily="49" charset="0"/>
-                <a:cs typeface="Courier New" panose="02070309020205020404" pitchFamily="49" charset="0"/>
-              </a:rPr>
-              <a:t> </a:t>
-            </a:r>
-            <a:r>
-              <a:rPr lang="es-AR" sz="2400" dirty="0" err="1" smtClean="0">
-                <a:solidFill>
-                  <a:srgbClr val="7030A0"/>
-                </a:solidFill>
-                <a:latin typeface="Courier New" panose="02070309020205020404" pitchFamily="49" charset="0"/>
-                <a:cs typeface="Courier New" panose="02070309020205020404" pitchFamily="49" charset="0"/>
-              </a:rPr>
-              <a:t>null</a:t>
-            </a:r>
-            <a:r>
-              <a:rPr lang="es-AR" sz="2400" dirty="0" smtClean="0">
-                <a:latin typeface="Courier New" panose="02070309020205020404" pitchFamily="49" charset="0"/>
-                <a:cs typeface="Courier New" panose="02070309020205020404" pitchFamily="49" charset="0"/>
-              </a:rPr>
-              <a:t>) {</a:t>
-            </a:r>
-          </a:p>
-          <a:p>
-            <a:r>
-              <a:rPr lang="es-AR" sz="2400" dirty="0">
-                <a:solidFill>
-                  <a:schemeClr val="tx1">
-                    <a:lumMod val="65000"/>
-                    <a:lumOff val="35000"/>
-                  </a:schemeClr>
-                </a:solidFill>
-                <a:latin typeface="Courier New" panose="02070309020205020404" pitchFamily="49" charset="0"/>
-                <a:cs typeface="Courier New" panose="02070309020205020404" pitchFamily="49" charset="0"/>
-              </a:rPr>
-              <a:t>	</a:t>
-            </a:r>
-            <a:r>
-              <a:rPr lang="es-AR" sz="2400" dirty="0" smtClean="0">
-                <a:solidFill>
-                  <a:schemeClr val="tx1">
-                    <a:lumMod val="65000"/>
-                    <a:lumOff val="35000"/>
-                  </a:schemeClr>
-                </a:solidFill>
-                <a:latin typeface="Courier New" panose="02070309020205020404" pitchFamily="49" charset="0"/>
-                <a:cs typeface="Courier New" panose="02070309020205020404" pitchFamily="49" charset="0"/>
-              </a:rPr>
-              <a:t>// El dispositivo no tiene </a:t>
-            </a:r>
-            <a:r>
-              <a:rPr lang="es-AR" sz="2400" dirty="0" err="1" smtClean="0">
-                <a:solidFill>
-                  <a:schemeClr val="tx1">
-                    <a:lumMod val="65000"/>
-                    <a:lumOff val="35000"/>
-                  </a:schemeClr>
-                </a:solidFill>
-                <a:latin typeface="Courier New" panose="02070309020205020404" pitchFamily="49" charset="0"/>
-                <a:cs typeface="Courier New" panose="02070309020205020404" pitchFamily="49" charset="0"/>
-              </a:rPr>
-              <a:t>bluetooth</a:t>
-            </a:r>
-            <a:r>
-              <a:rPr lang="es-AR" sz="2400" dirty="0" smtClean="0">
-                <a:solidFill>
-                  <a:schemeClr val="tx1">
-                    <a:lumMod val="65000"/>
-                    <a:lumOff val="35000"/>
-                  </a:schemeClr>
-                </a:solidFill>
-                <a:latin typeface="Courier New" panose="02070309020205020404" pitchFamily="49" charset="0"/>
-                <a:cs typeface="Courier New" panose="02070309020205020404" pitchFamily="49" charset="0"/>
-              </a:rPr>
-              <a:t>.</a:t>
-            </a:r>
-          </a:p>
-          <a:p>
-            <a:r>
-              <a:rPr lang="es-AR" sz="2400" dirty="0" smtClean="0">
-                <a:latin typeface="Courier New" panose="02070309020205020404" pitchFamily="49" charset="0"/>
-                <a:cs typeface="Courier New" panose="02070309020205020404" pitchFamily="49" charset="0"/>
-              </a:rPr>
-              <a:t>}</a:t>
-            </a:r>
+              </a:rPr>
+              <a:t>/&gt;</a:t>
+            </a:r>
+            <a:endParaRPr lang="es-AR" sz="2400" dirty="0" smtClean="0">
+              <a:solidFill>
+                <a:schemeClr val="accent6"/>
+              </a:solidFill>
+              <a:latin typeface="Courier New" panose="02070309020205020404" pitchFamily="49" charset="0"/>
+              <a:cs typeface="Courier New" panose="02070309020205020404" pitchFamily="49" charset="0"/>
+            </a:endParaRPr>
           </a:p>
         </p:txBody>
       </p:sp>
@@ -17744,7 +17485,15 @@
               </a:r>
               <a:r>
                 <a:rPr lang="es-AR" sz="2400" dirty="0" smtClean="0"/>
-                <a:t> pone </a:t>
+                <a:t> </a:t>
+              </a:r>
+              <a:r>
+                <a:rPr lang="es-AR" sz="2400" smtClean="0"/>
+                <a:t>phone</a:t>
+              </a:r>
+              <a:r>
+                <a:rPr lang="es-AR" sz="2400" dirty="0" smtClean="0"/>
+                <a:t> </a:t>
               </a:r>
               <a:r>
                 <a:rPr lang="es-AR" sz="2400" dirty="0" err="1" smtClean="0"/>

</xml_diff>